<commit_message>
Updated RANSAC before submission
</commit_message>
<xml_diff>
--- a/RANSAC/RANSAC.pptx
+++ b/RANSAC/RANSAC.pptx
@@ -216,7 +216,7 @@
           <a:p>
             <a:fld id="{CA835E94-03C3-4829-87F5-1BCAE5B78069}" type="datetimeFigureOut">
               <a:rPr lang="en-IL" smtClean="0"/>
-              <a:t>06/01/2022</a:t>
+              <a:t>10/01/2022</a:t>
             </a:fld>
             <a:endParaRPr lang="en-IL"/>
           </a:p>
@@ -613,7 +613,7 @@
           <a:p>
             <a:fld id="{9F3C49E6-D9EC-4034-9731-7892FF7FC3D8}" type="datetime1">
               <a:rPr lang="en-US" smtClean="0"/>
-              <a:t>1/6/2022</a:t>
+              <a:t>1/10/2022</a:t>
             </a:fld>
             <a:endParaRPr lang="en-US" dirty="0"/>
           </a:p>
@@ -781,7 +781,7 @@
           <a:p>
             <a:fld id="{BB3E0B60-9790-4381-9BA0-BCCF78FD4697}" type="datetime1">
               <a:rPr lang="en-US" smtClean="0"/>
-              <a:t>1/6/2022</a:t>
+              <a:t>1/10/2022</a:t>
             </a:fld>
             <a:endParaRPr lang="en-US" dirty="0"/>
           </a:p>
@@ -959,7 +959,7 @@
           <a:p>
             <a:fld id="{C9282981-334B-448B-9FDE-EB6658CE9CBE}" type="datetime1">
               <a:rPr lang="en-US" smtClean="0"/>
-              <a:t>1/6/2022</a:t>
+              <a:t>1/10/2022</a:t>
             </a:fld>
             <a:endParaRPr lang="en-US" dirty="0"/>
           </a:p>
@@ -1127,7 +1127,7 @@
           <a:p>
             <a:fld id="{660D70B8-CE09-4FFF-AE8A-67636ADAAC4D}" type="datetime1">
               <a:rPr lang="en-US" smtClean="0"/>
-              <a:t>1/6/2022</a:t>
+              <a:t>1/10/2022</a:t>
             </a:fld>
             <a:endParaRPr lang="en-US" dirty="0"/>
           </a:p>
@@ -1372,7 +1372,7 @@
           <a:p>
             <a:fld id="{AD0B0D67-F21A-4534-96EB-9AF475FC05ED}" type="datetime1">
               <a:rPr lang="en-US" smtClean="0"/>
-              <a:t>1/6/2022</a:t>
+              <a:t>1/10/2022</a:t>
             </a:fld>
             <a:endParaRPr lang="en-US" dirty="0"/>
           </a:p>
@@ -1601,7 +1601,7 @@
           <a:p>
             <a:fld id="{14B50E77-33EC-4A36-8482-ECBDB7352028}" type="datetime1">
               <a:rPr lang="en-US" smtClean="0"/>
-              <a:t>1/6/2022</a:t>
+              <a:t>1/10/2022</a:t>
             </a:fld>
             <a:endParaRPr lang="en-US" dirty="0"/>
           </a:p>
@@ -1965,7 +1965,7 @@
           <a:p>
             <a:fld id="{ACEED77A-FF81-44F1-90C7-ED47DCB502B6}" type="datetime1">
               <a:rPr lang="en-US" smtClean="0"/>
-              <a:t>1/6/2022</a:t>
+              <a:t>1/10/2022</a:t>
             </a:fld>
             <a:endParaRPr lang="en-US" dirty="0"/>
           </a:p>
@@ -2082,7 +2082,7 @@
           <a:p>
             <a:fld id="{458942FC-C333-4BE2-A82C-701F97CC151C}" type="datetime1">
               <a:rPr lang="en-US" smtClean="0"/>
-              <a:t>1/6/2022</a:t>
+              <a:t>1/10/2022</a:t>
             </a:fld>
             <a:endParaRPr lang="en-US" dirty="0"/>
           </a:p>
@@ -2177,7 +2177,7 @@
           <a:p>
             <a:fld id="{306691DF-E280-48E3-BA03-9B7A29E7E306}" type="datetime1">
               <a:rPr lang="en-US" smtClean="0"/>
-              <a:t>1/6/2022</a:t>
+              <a:t>1/10/2022</a:t>
             </a:fld>
             <a:endParaRPr lang="en-US" dirty="0"/>
           </a:p>
@@ -2452,7 +2452,7 @@
           <a:p>
             <a:fld id="{6FDCB84F-995F-403D-A6DF-D769E0F89373}" type="datetime1">
               <a:rPr lang="en-US" smtClean="0"/>
-              <a:t>1/6/2022</a:t>
+              <a:t>1/10/2022</a:t>
             </a:fld>
             <a:endParaRPr lang="en-US" dirty="0"/>
           </a:p>
@@ -2704,7 +2704,7 @@
           <a:p>
             <a:fld id="{05B43EA9-DA9D-4CCE-9296-16EC40D7A021}" type="datetime1">
               <a:rPr lang="en-US" smtClean="0"/>
-              <a:t>1/6/2022</a:t>
+              <a:t>1/10/2022</a:t>
             </a:fld>
             <a:endParaRPr lang="en-US" dirty="0"/>
           </a:p>
@@ -2915,7 +2915,7 @@
           <a:p>
             <a:fld id="{BE307345-9905-436A-8A7E-545FDF14C767}" type="datetime1">
               <a:rPr lang="en-US" smtClean="0"/>
-              <a:t>1/6/2022</a:t>
+              <a:t>1/10/2022</a:t>
             </a:fld>
             <a:endParaRPr lang="en-US" dirty="0"/>
           </a:p>
@@ -3655,8 +3655,8 @@
           </a:p>
         </p:txBody>
       </p:sp>
-      <mc:AlternateContent xmlns:mc="http://schemas.openxmlformats.org/markup-compatibility/2006">
-        <mc:Choice xmlns:a14="http://schemas.microsoft.com/office/drawing/2010/main" Requires="a14">
+      <mc:AlternateContent xmlns:mc="http://schemas.openxmlformats.org/markup-compatibility/2006" xmlns:a14="http://schemas.microsoft.com/office/drawing/2010/main">
+        <mc:Choice Requires="a14">
           <p:sp>
             <p:nvSpPr>
               <p:cNvPr id="10" name="TextBox 9">
@@ -3720,7 +3720,7 @@
             </p:txBody>
           </p:sp>
         </mc:Choice>
-        <mc:Fallback>
+        <mc:Fallback xmlns="">
           <p:sp>
             <p:nvSpPr>
               <p:cNvPr id="10" name="TextBox 9">
@@ -3884,8 +3884,8 @@
           </a:prstGeom>
         </p:spPr>
       </p:pic>
-      <mc:AlternateContent xmlns:mc="http://schemas.openxmlformats.org/markup-compatibility/2006">
-        <mc:Choice xmlns:a14="http://schemas.microsoft.com/office/drawing/2010/main" Requires="a14">
+      <mc:AlternateContent xmlns:mc="http://schemas.openxmlformats.org/markup-compatibility/2006" xmlns:a14="http://schemas.microsoft.com/office/drawing/2010/main">
+        <mc:Choice Requires="a14">
           <p:sp>
             <p:nvSpPr>
               <p:cNvPr id="12" name="TextBox 11">
@@ -3937,7 +3937,7 @@
             </p:txBody>
           </p:sp>
         </mc:Choice>
-        <mc:Fallback>
+        <mc:Fallback xmlns="">
           <p:sp>
             <p:nvSpPr>
               <p:cNvPr id="12" name="TextBox 11">
@@ -4093,8 +4093,8 @@
             </p:style>
           </p:cxnSp>
         </p:grpSp>
-        <mc:AlternateContent xmlns:mc="http://schemas.openxmlformats.org/markup-compatibility/2006">
-          <mc:Choice xmlns:a14="http://schemas.microsoft.com/office/drawing/2010/main" Requires="a14">
+        <mc:AlternateContent xmlns:mc="http://schemas.openxmlformats.org/markup-compatibility/2006" xmlns:a14="http://schemas.microsoft.com/office/drawing/2010/main">
+          <mc:Choice Requires="a14">
             <p:sp>
               <p:nvSpPr>
                 <p:cNvPr id="16" name="TextBox 15">
@@ -4153,7 +4153,7 @@
               </p:txBody>
             </p:sp>
           </mc:Choice>
-          <mc:Fallback>
+          <mc:Fallback xmlns="">
             <p:sp>
               <p:nvSpPr>
                 <p:cNvPr id="16" name="TextBox 15">
@@ -4575,8 +4575,8 @@
           </p:txBody>
         </p:sp>
       </p:grpSp>
-      <mc:AlternateContent xmlns:mc="http://schemas.openxmlformats.org/markup-compatibility/2006">
-        <mc:Choice xmlns:a14="http://schemas.microsoft.com/office/drawing/2010/main" Requires="a14">
+      <mc:AlternateContent xmlns:mc="http://schemas.openxmlformats.org/markup-compatibility/2006" xmlns:a14="http://schemas.microsoft.com/office/drawing/2010/main">
+        <mc:Choice Requires="a14">
           <p:sp>
             <p:nvSpPr>
               <p:cNvPr id="12" name="TextBox 11">
@@ -4778,7 +4778,13 @@
                                       <a:rPr lang="en-US" sz="4000" b="0" i="1" smtClean="0">
                                         <a:latin typeface="Cambria Math" panose="02040503050406030204" pitchFamily="18" charset="0"/>
                                       </a:rPr>
-                                      <m:t>11</m:t>
+                                      <m:t>1</m:t>
+                                    </m:r>
+                                    <m:r>
+                                      <a:rPr lang="en-US" sz="4000" b="0" i="1" smtClean="0">
+                                        <a:latin typeface="Cambria Math" panose="02040503050406030204" pitchFamily="18" charset="0"/>
+                                      </a:rPr>
+                                      <m:t>1</m:t>
                                     </m:r>
                                   </m:sub>
                                 </m:sSub>
@@ -5100,7 +5106,7 @@
             </p:txBody>
           </p:sp>
         </mc:Choice>
-        <mc:Fallback>
+        <mc:Fallback xmlns="">
           <p:sp>
             <p:nvSpPr>
               <p:cNvPr id="12" name="TextBox 11">
@@ -5957,8 +5963,8 @@
           </p:txBody>
         </p:sp>
       </p:grpSp>
-      <mc:AlternateContent xmlns:mc="http://schemas.openxmlformats.org/markup-compatibility/2006">
-        <mc:Choice xmlns:a14="http://schemas.microsoft.com/office/drawing/2010/main" Requires="a14">
+      <mc:AlternateContent xmlns:mc="http://schemas.openxmlformats.org/markup-compatibility/2006" xmlns:a14="http://schemas.microsoft.com/office/drawing/2010/main">
+        <mc:Choice Requires="a14">
           <p:sp>
             <p:nvSpPr>
               <p:cNvPr id="22" name="TextBox 21">
@@ -6136,7 +6142,7 @@
             </p:txBody>
           </p:sp>
         </mc:Choice>
-        <mc:Fallback>
+        <mc:Fallback xmlns="">
           <p:sp>
             <p:nvSpPr>
               <p:cNvPr id="22" name="TextBox 21">
@@ -7774,8 +7780,8 @@
             </a:fontRef>
           </p:style>
         </p:cxnSp>
-        <mc:AlternateContent xmlns:mc="http://schemas.openxmlformats.org/markup-compatibility/2006">
-          <mc:Choice xmlns:a14="http://schemas.microsoft.com/office/drawing/2010/main" Requires="a14">
+        <mc:AlternateContent xmlns:mc="http://schemas.openxmlformats.org/markup-compatibility/2006" xmlns:a14="http://schemas.microsoft.com/office/drawing/2010/main">
+          <mc:Choice Requires="a14">
             <p:sp>
               <p:nvSpPr>
                 <p:cNvPr id="89" name="TextBox 88"/>
@@ -7817,7 +7823,7 @@
               </p:txBody>
             </p:sp>
           </mc:Choice>
-          <mc:Fallback>
+          <mc:Fallback xmlns="">
             <p:sp>
               <p:nvSpPr>
                 <p:cNvPr id="89" name="TextBox 88"/>
@@ -10466,8 +10472,8 @@
             </a:fontRef>
           </p:style>
         </p:cxnSp>
-        <mc:AlternateContent xmlns:mc="http://schemas.openxmlformats.org/markup-compatibility/2006">
-          <mc:Choice xmlns:a14="http://schemas.microsoft.com/office/drawing/2010/main" Requires="a14">
+        <mc:AlternateContent xmlns:mc="http://schemas.openxmlformats.org/markup-compatibility/2006" xmlns:a14="http://schemas.microsoft.com/office/drawing/2010/main">
+          <mc:Choice Requires="a14">
             <p:sp>
               <p:nvSpPr>
                 <p:cNvPr id="44" name="TextBox 43"/>
@@ -10509,7 +10515,7 @@
               </p:txBody>
             </p:sp>
           </mc:Choice>
-          <mc:Fallback>
+          <mc:Fallback xmlns="">
             <p:sp>
               <p:nvSpPr>
                 <p:cNvPr id="44" name="TextBox 43"/>
@@ -12657,8 +12663,8 @@
           </a:prstGeom>
         </p:spPr>
       </p:pic>
-      <mc:AlternateContent xmlns:mc="http://schemas.openxmlformats.org/markup-compatibility/2006">
-        <mc:Choice xmlns:a14="http://schemas.microsoft.com/office/drawing/2010/main" Requires="a14">
+      <mc:AlternateContent xmlns:mc="http://schemas.openxmlformats.org/markup-compatibility/2006" xmlns:a14="http://schemas.microsoft.com/office/drawing/2010/main">
+        <mc:Choice Requires="a14">
           <p:sp>
             <p:nvSpPr>
               <p:cNvPr id="7" name="TextBox 6">
@@ -12809,7 +12815,7 @@
             </p:txBody>
           </p:sp>
         </mc:Choice>
-        <mc:Fallback>
+        <mc:Fallback xmlns="">
           <p:sp>
             <p:nvSpPr>
               <p:cNvPr id="7" name="TextBox 6">
@@ -12886,6 +12892,35 @@
       </p:grpSpPr>
       <p:pic>
         <p:nvPicPr>
+          <p:cNvPr id="12" name="Picture 11">
+            <a:extLst>
+              <a:ext uri="{FF2B5EF4-FFF2-40B4-BE49-F238E27FC236}">
+                <a16:creationId xmlns:a16="http://schemas.microsoft.com/office/drawing/2014/main" id="{9C27A66A-592F-441C-B379-51104742D28B}"/>
+              </a:ext>
+            </a:extLst>
+          </p:cNvPr>
+          <p:cNvPicPr>
+            <a:picLocks noChangeAspect="1"/>
+          </p:cNvPicPr>
+          <p:nvPr/>
+        </p:nvPicPr>
+        <p:blipFill rotWithShape="1">
+          <a:blip r:embed="rId2"/>
+          <a:srcRect l="166" t="18066" r="-165" b="58891"/>
+          <a:stretch/>
+        </p:blipFill>
+        <p:spPr>
+          <a:xfrm>
+            <a:off x="647702" y="1432278"/>
+            <a:ext cx="10401298" cy="1433513"/>
+          </a:xfrm>
+          <a:prstGeom prst="rect">
+            <a:avLst/>
+          </a:prstGeom>
+        </p:spPr>
+      </p:pic>
+      <p:pic>
+        <p:nvPicPr>
           <p:cNvPr id="13" name="Picture 12">
             <a:extLst>
               <a:ext uri="{FF2B5EF4-FFF2-40B4-BE49-F238E27FC236}">
@@ -12898,16 +12933,15 @@
           </p:cNvPicPr>
           <p:nvPr/>
         </p:nvPicPr>
-        <p:blipFill>
+        <p:blipFill rotWithShape="1">
           <a:blip r:embed="rId2"/>
-          <a:stretch>
-            <a:fillRect/>
-          </a:stretch>
+          <a:srcRect b="82699"/>
+          <a:stretch/>
         </p:blipFill>
         <p:spPr>
           <a:xfrm>
-            <a:off x="647702" y="390525"/>
-            <a:ext cx="10401298" cy="6221236"/>
+            <a:off x="647702" y="246240"/>
+            <a:ext cx="10401298" cy="1076323"/>
           </a:xfrm>
           <a:prstGeom prst="rect">
             <a:avLst/>
@@ -12943,224 +12977,93 @@
           </a:p>
         </p:txBody>
       </p:sp>
-      <p:cxnSp>
-        <p:nvCxnSpPr>
-          <p:cNvPr id="8" name="Straight Arrow Connector 7">
+      <p:pic>
+        <p:nvPicPr>
+          <p:cNvPr id="10" name="Picture 9">
             <a:extLst>
               <a:ext uri="{FF2B5EF4-FFF2-40B4-BE49-F238E27FC236}">
-                <a16:creationId xmlns:a16="http://schemas.microsoft.com/office/drawing/2014/main" id="{C422B5E9-7418-4B95-919E-C972539131E6}"/>
+                <a16:creationId xmlns:a16="http://schemas.microsoft.com/office/drawing/2014/main" id="{88326264-1378-4B00-AA2C-EC5FA3FC74F4}"/>
               </a:ext>
             </a:extLst>
           </p:cNvPr>
-          <p:cNvCxnSpPr/>
+          <p:cNvPicPr>
+            <a:picLocks noChangeAspect="1"/>
+          </p:cNvPicPr>
           <p:nvPr/>
-        </p:nvCxnSpPr>
+        </p:nvPicPr>
+        <p:blipFill rotWithShape="1">
+          <a:blip r:embed="rId2"/>
+          <a:srcRect t="94131"/>
+          <a:stretch/>
+        </p:blipFill>
         <p:spPr>
-          <a:xfrm flipH="1">
-            <a:off x="3976687" y="923925"/>
-            <a:ext cx="4238625" cy="0"/>
+          <a:xfrm>
+            <a:off x="647702" y="6356350"/>
+            <a:ext cx="10401298" cy="365125"/>
           </a:xfrm>
-          <a:prstGeom prst="straightConnector1">
+          <a:prstGeom prst="rect">
             <a:avLst/>
           </a:prstGeom>
-          <a:ln w="76200">
-            <a:solidFill>
-              <a:srgbClr val="FFC000"/>
-            </a:solidFill>
-            <a:tailEnd type="triangle"/>
-          </a:ln>
         </p:spPr>
-        <p:style>
-          <a:lnRef idx="1">
-            <a:schemeClr val="accent1"/>
-          </a:lnRef>
-          <a:fillRef idx="0">
-            <a:schemeClr val="accent1"/>
-          </a:fillRef>
-          <a:effectRef idx="0">
-            <a:schemeClr val="accent1"/>
-          </a:effectRef>
-          <a:fontRef idx="minor">
-            <a:schemeClr val="tx1"/>
-          </a:fontRef>
-        </p:style>
-      </p:cxnSp>
-      <p:cxnSp>
-        <p:nvCxnSpPr>
-          <p:cNvPr id="9" name="Straight Arrow Connector 8">
+      </p:pic>
+      <p:pic>
+        <p:nvPicPr>
+          <p:cNvPr id="14" name="Picture 13">
             <a:extLst>
               <a:ext uri="{FF2B5EF4-FFF2-40B4-BE49-F238E27FC236}">
-                <a16:creationId xmlns:a16="http://schemas.microsoft.com/office/drawing/2014/main" id="{025F2ED4-1A1F-41FF-AE68-A376A5C86C80}"/>
+                <a16:creationId xmlns:a16="http://schemas.microsoft.com/office/drawing/2014/main" id="{137989A7-EE12-4564-B0F3-D41D7DAF5734}"/>
               </a:ext>
             </a:extLst>
           </p:cNvPr>
-          <p:cNvCxnSpPr>
-            <a:cxnSpLocks/>
-          </p:cNvCxnSpPr>
+          <p:cNvPicPr>
+            <a:picLocks noChangeAspect="1"/>
+          </p:cNvPicPr>
           <p:nvPr/>
-        </p:nvCxnSpPr>
+        </p:nvPicPr>
+        <p:blipFill rotWithShape="1">
+          <a:blip r:embed="rId2"/>
+          <a:srcRect t="41865" b="37132"/>
+          <a:stretch/>
+        </p:blipFill>
         <p:spPr>
-          <a:xfrm flipH="1">
-            <a:off x="7572375" y="2209800"/>
-            <a:ext cx="3476625" cy="0"/>
+          <a:xfrm>
+            <a:off x="647702" y="2972310"/>
+            <a:ext cx="10401298" cy="1306573"/>
           </a:xfrm>
-          <a:prstGeom prst="straightConnector1">
+          <a:prstGeom prst="rect">
             <a:avLst/>
           </a:prstGeom>
-          <a:ln w="76200">
-            <a:solidFill>
-              <a:srgbClr val="FFC000"/>
-            </a:solidFill>
-            <a:tailEnd type="triangle"/>
-          </a:ln>
         </p:spPr>
-        <p:style>
-          <a:lnRef idx="1">
-            <a:schemeClr val="accent1"/>
-          </a:lnRef>
-          <a:fillRef idx="0">
-            <a:schemeClr val="accent1"/>
-          </a:fillRef>
-          <a:effectRef idx="0">
-            <a:schemeClr val="accent1"/>
-          </a:effectRef>
-          <a:fontRef idx="minor">
-            <a:schemeClr val="tx1"/>
-          </a:fontRef>
-        </p:style>
-      </p:cxnSp>
-      <p:cxnSp>
-        <p:nvCxnSpPr>
-          <p:cNvPr id="15" name="Straight Arrow Connector 14">
+      </p:pic>
+      <p:pic>
+        <p:nvPicPr>
+          <p:cNvPr id="16" name="Picture 15">
             <a:extLst>
               <a:ext uri="{FF2B5EF4-FFF2-40B4-BE49-F238E27FC236}">
-                <a16:creationId xmlns:a16="http://schemas.microsoft.com/office/drawing/2014/main" id="{30EA0AA8-EEC7-44A1-AADE-7714BA0CF7AF}"/>
+                <a16:creationId xmlns:a16="http://schemas.microsoft.com/office/drawing/2014/main" id="{94EBA9ED-31AD-4432-8358-04870E5A19A3}"/>
               </a:ext>
             </a:extLst>
           </p:cNvPr>
-          <p:cNvCxnSpPr>
-            <a:cxnSpLocks/>
-          </p:cNvCxnSpPr>
+          <p:cNvPicPr>
+            <a:picLocks noChangeAspect="1"/>
+          </p:cNvPicPr>
           <p:nvPr/>
-        </p:nvCxnSpPr>
+        </p:nvPicPr>
+        <p:blipFill rotWithShape="1">
+          <a:blip r:embed="rId2"/>
+          <a:srcRect t="62825" b="8003"/>
+          <a:stretch/>
+        </p:blipFill>
         <p:spPr>
-          <a:xfrm flipH="1">
-            <a:off x="6257926" y="3190875"/>
-            <a:ext cx="4238624" cy="0"/>
+          <a:xfrm>
+            <a:off x="647702" y="4385402"/>
+            <a:ext cx="10401298" cy="1814761"/>
           </a:xfrm>
-          <a:prstGeom prst="straightConnector1">
+          <a:prstGeom prst="rect">
             <a:avLst/>
           </a:prstGeom>
-          <a:ln w="76200">
-            <a:solidFill>
-              <a:srgbClr val="FFC000"/>
-            </a:solidFill>
-            <a:tailEnd type="triangle"/>
-          </a:ln>
         </p:spPr>
-        <p:style>
-          <a:lnRef idx="1">
-            <a:schemeClr val="accent1"/>
-          </a:lnRef>
-          <a:fillRef idx="0">
-            <a:schemeClr val="accent1"/>
-          </a:fillRef>
-          <a:effectRef idx="0">
-            <a:schemeClr val="accent1"/>
-          </a:effectRef>
-          <a:fontRef idx="minor">
-            <a:schemeClr val="tx1"/>
-          </a:fontRef>
-        </p:style>
-      </p:cxnSp>
-      <p:cxnSp>
-        <p:nvCxnSpPr>
-          <p:cNvPr id="17" name="Straight Arrow Connector 16">
-            <a:extLst>
-              <a:ext uri="{FF2B5EF4-FFF2-40B4-BE49-F238E27FC236}">
-                <a16:creationId xmlns:a16="http://schemas.microsoft.com/office/drawing/2014/main" id="{6D8F7441-2D11-4366-A1A1-3D76349A99C2}"/>
-              </a:ext>
-            </a:extLst>
-          </p:cNvPr>
-          <p:cNvCxnSpPr>
-            <a:cxnSpLocks/>
-          </p:cNvCxnSpPr>
-          <p:nvPr/>
-        </p:nvCxnSpPr>
-        <p:spPr>
-          <a:xfrm flipH="1">
-            <a:off x="8091487" y="4448175"/>
-            <a:ext cx="3262313" cy="0"/>
-          </a:xfrm>
-          <a:prstGeom prst="straightConnector1">
-            <a:avLst/>
-          </a:prstGeom>
-          <a:ln w="76200">
-            <a:solidFill>
-              <a:srgbClr val="FFC000"/>
-            </a:solidFill>
-            <a:tailEnd type="triangle"/>
-          </a:ln>
-        </p:spPr>
-        <p:style>
-          <a:lnRef idx="1">
-            <a:schemeClr val="accent1"/>
-          </a:lnRef>
-          <a:fillRef idx="0">
-            <a:schemeClr val="accent1"/>
-          </a:fillRef>
-          <a:effectRef idx="0">
-            <a:schemeClr val="accent1"/>
-          </a:effectRef>
-          <a:fontRef idx="minor">
-            <a:schemeClr val="tx1"/>
-          </a:fontRef>
-        </p:style>
-      </p:cxnSp>
-      <p:cxnSp>
-        <p:nvCxnSpPr>
-          <p:cNvPr id="19" name="Straight Arrow Connector 18">
-            <a:extLst>
-              <a:ext uri="{FF2B5EF4-FFF2-40B4-BE49-F238E27FC236}">
-                <a16:creationId xmlns:a16="http://schemas.microsoft.com/office/drawing/2014/main" id="{02E8847E-4C96-47D6-8BCE-9359E1BE00C5}"/>
-              </a:ext>
-            </a:extLst>
-          </p:cNvPr>
-          <p:cNvCxnSpPr>
-            <a:cxnSpLocks/>
-          </p:cNvCxnSpPr>
-          <p:nvPr/>
-        </p:nvCxnSpPr>
-        <p:spPr>
-          <a:xfrm flipH="1">
-            <a:off x="7877175" y="5191125"/>
-            <a:ext cx="3262313" cy="0"/>
-          </a:xfrm>
-          <a:prstGeom prst="straightConnector1">
-            <a:avLst/>
-          </a:prstGeom>
-          <a:ln w="76200">
-            <a:solidFill>
-              <a:srgbClr val="FFC000"/>
-            </a:solidFill>
-            <a:tailEnd type="triangle"/>
-          </a:ln>
-        </p:spPr>
-        <p:style>
-          <a:lnRef idx="1">
-            <a:schemeClr val="accent1"/>
-          </a:lnRef>
-          <a:fillRef idx="0">
-            <a:schemeClr val="accent1"/>
-          </a:fillRef>
-          <a:effectRef idx="0">
-            <a:schemeClr val="accent1"/>
-          </a:effectRef>
-          <a:fontRef idx="minor">
-            <a:schemeClr val="tx1"/>
-          </a:fontRef>
-        </p:style>
-      </p:cxnSp>
+      </p:pic>
     </p:spTree>
     <p:extLst>
       <p:ext uri="{BB962C8B-B14F-4D97-AF65-F5344CB8AC3E}">
@@ -13205,7 +13108,34 @@
                                           </p:stCondLst>
                                         </p:cTn>
                                         <p:tgtEl>
-                                          <p:spTgt spid="8"/>
+                                          <p:spTgt spid="10"/>
+                                        </p:tgtEl>
+                                        <p:attrNameLst>
+                                          <p:attrName>style.visibility</p:attrName>
+                                        </p:attrNameLst>
+                                      </p:cBhvr>
+                                      <p:to>
+                                        <p:strVal val="visible"/>
+                                      </p:to>
+                                    </p:set>
+                                  </p:childTnLst>
+                                </p:cTn>
+                              </p:par>
+                              <p:par>
+                                <p:cTn id="7" presetID="1" presetClass="entr" presetSubtype="0" fill="hold" nodeType="withEffect">
+                                  <p:stCondLst>
+                                    <p:cond delay="0"/>
+                                  </p:stCondLst>
+                                  <p:childTnLst>
+                                    <p:set>
+                                      <p:cBhvr>
+                                        <p:cTn id="8" dur="1" fill="hold">
+                                          <p:stCondLst>
+                                            <p:cond delay="0"/>
+                                          </p:stCondLst>
+                                        </p:cTn>
+                                        <p:tgtEl>
+                                          <p:spTgt spid="13"/>
                                         </p:tgtEl>
                                         <p:attrNameLst>
                                           <p:attrName>style.visibility</p:attrName>
@@ -13225,32 +13155,32 @@
                     </p:cTn>
                   </p:par>
                   <p:par>
-                    <p:cTn id="7" fill="hold">
+                    <p:cTn id="9" fill="hold">
                       <p:stCondLst>
                         <p:cond delay="indefinite"/>
                       </p:stCondLst>
                       <p:childTnLst>
                         <p:par>
-                          <p:cTn id="8" fill="hold">
+                          <p:cTn id="10" fill="hold">
                             <p:stCondLst>
                               <p:cond delay="0"/>
                             </p:stCondLst>
                             <p:childTnLst>
                               <p:par>
-                                <p:cTn id="9" presetID="1" presetClass="entr" presetSubtype="0" fill="hold" nodeType="clickEffect">
+                                <p:cTn id="11" presetID="1" presetClass="entr" presetSubtype="0" fill="hold" nodeType="clickEffect">
                                   <p:stCondLst>
                                     <p:cond delay="0"/>
                                   </p:stCondLst>
                                   <p:childTnLst>
                                     <p:set>
                                       <p:cBhvr>
-                                        <p:cTn id="10" dur="1" fill="hold">
+                                        <p:cTn id="12" dur="1" fill="hold">
                                           <p:stCondLst>
                                             <p:cond delay="0"/>
                                           </p:stCondLst>
                                         </p:cTn>
                                         <p:tgtEl>
-                                          <p:spTgt spid="9"/>
+                                          <p:spTgt spid="12"/>
                                         </p:tgtEl>
                                         <p:attrNameLst>
                                           <p:attrName>style.visibility</p:attrName>
@@ -13270,32 +13200,32 @@
                     </p:cTn>
                   </p:par>
                   <p:par>
-                    <p:cTn id="11" fill="hold">
+                    <p:cTn id="13" fill="hold">
                       <p:stCondLst>
                         <p:cond delay="indefinite"/>
                       </p:stCondLst>
                       <p:childTnLst>
                         <p:par>
-                          <p:cTn id="12" fill="hold">
+                          <p:cTn id="14" fill="hold">
                             <p:stCondLst>
                               <p:cond delay="0"/>
                             </p:stCondLst>
                             <p:childTnLst>
                               <p:par>
-                                <p:cTn id="13" presetID="1" presetClass="entr" presetSubtype="0" fill="hold" nodeType="clickEffect">
+                                <p:cTn id="15" presetID="1" presetClass="entr" presetSubtype="0" fill="hold" nodeType="clickEffect">
                                   <p:stCondLst>
                                     <p:cond delay="0"/>
                                   </p:stCondLst>
                                   <p:childTnLst>
                                     <p:set>
                                       <p:cBhvr>
-                                        <p:cTn id="14" dur="1" fill="hold">
+                                        <p:cTn id="16" dur="1" fill="hold">
                                           <p:stCondLst>
                                             <p:cond delay="0"/>
                                           </p:stCondLst>
                                         </p:cTn>
                                         <p:tgtEl>
-                                          <p:spTgt spid="15"/>
+                                          <p:spTgt spid="14"/>
                                         </p:tgtEl>
                                         <p:attrNameLst>
                                           <p:attrName>style.visibility</p:attrName>
@@ -13315,77 +13245,32 @@
                     </p:cTn>
                   </p:par>
                   <p:par>
-                    <p:cTn id="15" fill="hold">
+                    <p:cTn id="17" fill="hold">
                       <p:stCondLst>
                         <p:cond delay="indefinite"/>
                       </p:stCondLst>
                       <p:childTnLst>
                         <p:par>
-                          <p:cTn id="16" fill="hold">
+                          <p:cTn id="18" fill="hold">
                             <p:stCondLst>
                               <p:cond delay="0"/>
                             </p:stCondLst>
                             <p:childTnLst>
                               <p:par>
-                                <p:cTn id="17" presetID="1" presetClass="entr" presetSubtype="0" fill="hold" nodeType="clickEffect">
+                                <p:cTn id="19" presetID="1" presetClass="entr" presetSubtype="0" fill="hold" nodeType="clickEffect">
                                   <p:stCondLst>
                                     <p:cond delay="0"/>
                                   </p:stCondLst>
                                   <p:childTnLst>
                                     <p:set>
                                       <p:cBhvr>
-                                        <p:cTn id="18" dur="1" fill="hold">
+                                        <p:cTn id="20" dur="1" fill="hold">
                                           <p:stCondLst>
                                             <p:cond delay="0"/>
                                           </p:stCondLst>
                                         </p:cTn>
                                         <p:tgtEl>
-                                          <p:spTgt spid="17"/>
-                                        </p:tgtEl>
-                                        <p:attrNameLst>
-                                          <p:attrName>style.visibility</p:attrName>
-                                        </p:attrNameLst>
-                                      </p:cBhvr>
-                                      <p:to>
-                                        <p:strVal val="visible"/>
-                                      </p:to>
-                                    </p:set>
-                                  </p:childTnLst>
-                                </p:cTn>
-                              </p:par>
-                            </p:childTnLst>
-                          </p:cTn>
-                        </p:par>
-                      </p:childTnLst>
-                    </p:cTn>
-                  </p:par>
-                  <p:par>
-                    <p:cTn id="19" fill="hold">
-                      <p:stCondLst>
-                        <p:cond delay="indefinite"/>
-                      </p:stCondLst>
-                      <p:childTnLst>
-                        <p:par>
-                          <p:cTn id="20" fill="hold">
-                            <p:stCondLst>
-                              <p:cond delay="0"/>
-                            </p:stCondLst>
-                            <p:childTnLst>
-                              <p:par>
-                                <p:cTn id="21" presetID="1" presetClass="entr" presetSubtype="0" fill="hold" nodeType="clickEffect">
-                                  <p:stCondLst>
-                                    <p:cond delay="0"/>
-                                  </p:stCondLst>
-                                  <p:childTnLst>
-                                    <p:set>
-                                      <p:cBhvr>
-                                        <p:cTn id="22" dur="1" fill="hold">
-                                          <p:stCondLst>
-                                            <p:cond delay="0"/>
-                                          </p:stCondLst>
-                                        </p:cTn>
-                                        <p:tgtEl>
-                                          <p:spTgt spid="19"/>
+                                          <p:spTgt spid="16"/>
                                         </p:tgtEl>
                                         <p:attrNameLst>
                                           <p:attrName>style.visibility</p:attrName>
@@ -13488,8 +13373,8 @@
           </a:p>
         </p:txBody>
       </p:sp>
-      <mc:AlternateContent xmlns:mc="http://schemas.openxmlformats.org/markup-compatibility/2006">
-        <mc:Choice xmlns:a14="http://schemas.microsoft.com/office/drawing/2010/main" Requires="a14">
+      <mc:AlternateContent xmlns:mc="http://schemas.openxmlformats.org/markup-compatibility/2006" xmlns:a14="http://schemas.microsoft.com/office/drawing/2010/main">
+        <mc:Choice Requires="a14">
           <p:sp>
             <p:nvSpPr>
               <p:cNvPr id="9" name="TextBox 8">
@@ -13793,7 +13678,7 @@
             </p:txBody>
           </p:sp>
         </mc:Choice>
-        <mc:Fallback>
+        <mc:Fallback xmlns="">
           <p:sp>
             <p:nvSpPr>
               <p:cNvPr id="9" name="TextBox 8">
@@ -14262,8 +14147,8 @@
           </a:p>
         </p:txBody>
       </p:sp>
-      <mc:AlternateContent xmlns:mc="http://schemas.openxmlformats.org/markup-compatibility/2006">
-        <mc:Choice xmlns:a14="http://schemas.microsoft.com/office/drawing/2010/main" Requires="a14">
+      <mc:AlternateContent xmlns:mc="http://schemas.openxmlformats.org/markup-compatibility/2006" xmlns:a14="http://schemas.microsoft.com/office/drawing/2010/main">
+        <mc:Choice Requires="a14">
           <p:sp>
             <p:nvSpPr>
               <p:cNvPr id="14" name="TextBox 13">
@@ -14351,7 +14236,7 @@
             </p:txBody>
           </p:sp>
         </mc:Choice>
-        <mc:Fallback>
+        <mc:Fallback xmlns="">
           <p:sp>
             <p:nvSpPr>
               <p:cNvPr id="14" name="TextBox 13">

</xml_diff>